<commit_message>
Updating Pval Image, Incorporating suggestions in Design
</commit_message>
<xml_diff>
--- a/graphs/CrossVal.pptx
+++ b/graphs/CrossVal.pptx
@@ -5118,7 +5118,7 @@
           <p:nvPr>
             <p:extLst>
               <p:ext uri="{D42A27DB-BD31-4B8C-83A1-F6EECF244321}">
-                <p14:modId xmlns:p14="http://schemas.microsoft.com/office/powerpoint/2010/main" val="4159095322"/>
+                <p14:modId xmlns:p14="http://schemas.microsoft.com/office/powerpoint/2010/main" val="336902143"/>
               </p:ext>
             </p:extLst>
           </p:nvPr>
@@ -5142,7 +5142,7 @@
           <p:nvPr>
             <p:extLst>
               <p:ext uri="{D42A27DB-BD31-4B8C-83A1-F6EECF244321}">
-                <p14:modId xmlns:p14="http://schemas.microsoft.com/office/powerpoint/2010/main" val="838901468"/>
+                <p14:modId xmlns:p14="http://schemas.microsoft.com/office/powerpoint/2010/main" val="3060110895"/>
               </p:ext>
             </p:extLst>
           </p:nvPr>

</xml_diff>